<commit_message>
updating talk for vector today.
</commit_message>
<xml_diff>
--- a/talk/main.pptx
+++ b/talk/main.pptx
@@ -4,6 +4,9 @@
   <p:sldMasterIdLst>
     <p:sldMasterId id="2147483876" r:id="rId1"/>
   </p:sldMasterIdLst>
+  <p:notesMasterIdLst>
+    <p:notesMasterId r:id="rId14"/>
+  </p:notesMasterIdLst>
   <p:sldIdLst>
     <p:sldId id="256" r:id="rId2"/>
     <p:sldId id="257" r:id="rId3"/>
@@ -15,6 +18,8 @@
     <p:sldId id="261" r:id="rId9"/>
     <p:sldId id="266" r:id="rId10"/>
     <p:sldId id="262" r:id="rId11"/>
+    <p:sldId id="268" r:id="rId12"/>
+    <p:sldId id="267" r:id="rId13"/>
   </p:sldIdLst>
   <p:sldSz cx="12192000" cy="6858000"/>
   <p:notesSz cx="6858000" cy="9144000"/>
@@ -128,6 +133,8 @@
             <p14:sldId id="261"/>
             <p14:sldId id="266"/>
             <p14:sldId id="262"/>
+            <p14:sldId id="268"/>
+            <p14:sldId id="267"/>
           </p14:sldIdLst>
         </p14:section>
       </p14:sectionLst>
@@ -137,6 +144,1132 @@
     </p:ext>
   </p:extLst>
 </p:presentation>
+</file>
+
+<file path=ppt/commentAuthors.xml><?xml version="1.0" encoding="utf-8"?>
+<p:cmAuthorLst xmlns:a="http://schemas.openxmlformats.org/drawingml/2006/main" xmlns:r="http://schemas.openxmlformats.org/officeDocument/2006/relationships" xmlns:p="http://schemas.openxmlformats.org/presentationml/2006/main">
+  <p:cmAuthor id="1" name="Peter Lorraine" initials="PL" lastIdx="2" clrIdx="0">
+    <p:extLst>
+      <p:ext uri="{19B8F6BF-5375-455C-9EA6-DF929625EA0E}">
+        <p15:presenceInfo xmlns:p15="http://schemas.microsoft.com/office/powerpoint/2012/main" userId="84b963008d5eadcf" providerId="Windows Live"/>
+      </p:ext>
+    </p:extLst>
+  </p:cmAuthor>
+</p:cmAuthorLst>
+</file>
+
+<file path=ppt/notesMasters/notesMaster1.xml><?xml version="1.0" encoding="utf-8"?>
+<p:notesMaster xmlns:a="http://schemas.openxmlformats.org/drawingml/2006/main" xmlns:r="http://schemas.openxmlformats.org/officeDocument/2006/relationships" xmlns:p="http://schemas.openxmlformats.org/presentationml/2006/main">
+  <p:cSld>
+    <p:bg>
+      <p:bgRef idx="1001">
+        <a:schemeClr val="bg1"/>
+      </p:bgRef>
+    </p:bg>
+    <p:spTree>
+      <p:nvGrpSpPr>
+        <p:cNvPr id="1" name=""/>
+        <p:cNvGrpSpPr/>
+        <p:nvPr/>
+      </p:nvGrpSpPr>
+      <p:grpSpPr>
+        <a:xfrm>
+          <a:off x="0" y="0"/>
+          <a:ext cx="0" cy="0"/>
+          <a:chOff x="0" y="0"/>
+          <a:chExt cx="0" cy="0"/>
+        </a:xfrm>
+      </p:grpSpPr>
+      <p:sp>
+        <p:nvSpPr>
+          <p:cNvPr id="2" name="Header Placeholder 1"/>
+          <p:cNvSpPr>
+            <a:spLocks noGrp="1"/>
+          </p:cNvSpPr>
+          <p:nvPr>
+            <p:ph type="hdr" sz="quarter"/>
+          </p:nvPr>
+        </p:nvSpPr>
+        <p:spPr>
+          <a:xfrm>
+            <a:off x="0" y="0"/>
+            <a:ext cx="2971800" cy="458788"/>
+          </a:xfrm>
+          <a:prstGeom prst="rect">
+            <a:avLst/>
+          </a:prstGeom>
+        </p:spPr>
+        <p:txBody>
+          <a:bodyPr vert="horz" lIns="91440" tIns="45720" rIns="91440" bIns="45720" rtlCol="0"/>
+          <a:lstStyle>
+            <a:lvl1pPr algn="l">
+              <a:defRPr sz="1200"/>
+            </a:lvl1pPr>
+          </a:lstStyle>
+          <a:p>
+            <a:endParaRPr lang="en-US"/>
+          </a:p>
+        </p:txBody>
+      </p:sp>
+      <p:sp>
+        <p:nvSpPr>
+          <p:cNvPr id="3" name="Date Placeholder 2"/>
+          <p:cNvSpPr>
+            <a:spLocks noGrp="1"/>
+          </p:cNvSpPr>
+          <p:nvPr>
+            <p:ph type="dt" idx="1"/>
+          </p:nvPr>
+        </p:nvSpPr>
+        <p:spPr>
+          <a:xfrm>
+            <a:off x="3884613" y="0"/>
+            <a:ext cx="2971800" cy="458788"/>
+          </a:xfrm>
+          <a:prstGeom prst="rect">
+            <a:avLst/>
+          </a:prstGeom>
+        </p:spPr>
+        <p:txBody>
+          <a:bodyPr vert="horz" lIns="91440" tIns="45720" rIns="91440" bIns="45720" rtlCol="0"/>
+          <a:lstStyle>
+            <a:lvl1pPr algn="r">
+              <a:defRPr sz="1200"/>
+            </a:lvl1pPr>
+          </a:lstStyle>
+          <a:p>
+            <a:fld id="{F698E71A-4C7F-1941-89F2-560FB199EBB2}" type="datetimeFigureOut">
+              <a:rPr lang="en-US" smtClean="0"/>
+              <a:t>3/15/18</a:t>
+            </a:fld>
+            <a:endParaRPr lang="en-US"/>
+          </a:p>
+        </p:txBody>
+      </p:sp>
+      <p:sp>
+        <p:nvSpPr>
+          <p:cNvPr id="4" name="Slide Image Placeholder 3"/>
+          <p:cNvSpPr>
+            <a:spLocks noGrp="1" noRot="1" noChangeAspect="1"/>
+          </p:cNvSpPr>
+          <p:nvPr>
+            <p:ph type="sldImg" idx="2"/>
+          </p:nvPr>
+        </p:nvSpPr>
+        <p:spPr>
+          <a:xfrm>
+            <a:off x="685800" y="1143000"/>
+            <a:ext cx="5486400" cy="3086100"/>
+          </a:xfrm>
+          <a:prstGeom prst="rect">
+            <a:avLst/>
+          </a:prstGeom>
+          <a:noFill/>
+          <a:ln w="12700">
+            <a:solidFill>
+              <a:prstClr val="black"/>
+            </a:solidFill>
+          </a:ln>
+        </p:spPr>
+        <p:txBody>
+          <a:bodyPr vert="horz" lIns="91440" tIns="45720" rIns="91440" bIns="45720" rtlCol="0" anchor="ctr"/>
+          <a:lstStyle/>
+          <a:p>
+            <a:endParaRPr lang="en-US"/>
+          </a:p>
+        </p:txBody>
+      </p:sp>
+      <p:sp>
+        <p:nvSpPr>
+          <p:cNvPr id="5" name="Notes Placeholder 4"/>
+          <p:cNvSpPr>
+            <a:spLocks noGrp="1"/>
+          </p:cNvSpPr>
+          <p:nvPr>
+            <p:ph type="body" sz="quarter" idx="3"/>
+          </p:nvPr>
+        </p:nvSpPr>
+        <p:spPr>
+          <a:xfrm>
+            <a:off x="685800" y="4400550"/>
+            <a:ext cx="5486400" cy="3600450"/>
+          </a:xfrm>
+          <a:prstGeom prst="rect">
+            <a:avLst/>
+          </a:prstGeom>
+        </p:spPr>
+        <p:txBody>
+          <a:bodyPr vert="horz" lIns="91440" tIns="45720" rIns="91440" bIns="45720" rtlCol="0"/>
+          <a:lstStyle/>
+          <a:p>
+            <a:pPr lvl="0"/>
+            <a:r>
+              <a:rPr lang="en-US"/>
+              <a:t>Edit Master text styles</a:t>
+            </a:r>
+          </a:p>
+          <a:p>
+            <a:pPr lvl="1"/>
+            <a:r>
+              <a:rPr lang="en-US"/>
+              <a:t>Second level</a:t>
+            </a:r>
+          </a:p>
+          <a:p>
+            <a:pPr lvl="2"/>
+            <a:r>
+              <a:rPr lang="en-US"/>
+              <a:t>Third level</a:t>
+            </a:r>
+          </a:p>
+          <a:p>
+            <a:pPr lvl="3"/>
+            <a:r>
+              <a:rPr lang="en-US"/>
+              <a:t>Fourth level</a:t>
+            </a:r>
+          </a:p>
+          <a:p>
+            <a:pPr lvl="4"/>
+            <a:r>
+              <a:rPr lang="en-US"/>
+              <a:t>Fifth level</a:t>
+            </a:r>
+          </a:p>
+        </p:txBody>
+      </p:sp>
+      <p:sp>
+        <p:nvSpPr>
+          <p:cNvPr id="6" name="Footer Placeholder 5"/>
+          <p:cNvSpPr>
+            <a:spLocks noGrp="1"/>
+          </p:cNvSpPr>
+          <p:nvPr>
+            <p:ph type="ftr" sz="quarter" idx="4"/>
+          </p:nvPr>
+        </p:nvSpPr>
+        <p:spPr>
+          <a:xfrm>
+            <a:off x="0" y="8685213"/>
+            <a:ext cx="2971800" cy="458787"/>
+          </a:xfrm>
+          <a:prstGeom prst="rect">
+            <a:avLst/>
+          </a:prstGeom>
+        </p:spPr>
+        <p:txBody>
+          <a:bodyPr vert="horz" lIns="91440" tIns="45720" rIns="91440" bIns="45720" rtlCol="0" anchor="b"/>
+          <a:lstStyle>
+            <a:lvl1pPr algn="l">
+              <a:defRPr sz="1200"/>
+            </a:lvl1pPr>
+          </a:lstStyle>
+          <a:p>
+            <a:endParaRPr lang="en-US"/>
+          </a:p>
+        </p:txBody>
+      </p:sp>
+      <p:sp>
+        <p:nvSpPr>
+          <p:cNvPr id="7" name="Slide Number Placeholder 6"/>
+          <p:cNvSpPr>
+            <a:spLocks noGrp="1"/>
+          </p:cNvSpPr>
+          <p:nvPr>
+            <p:ph type="sldNum" sz="quarter" idx="5"/>
+          </p:nvPr>
+        </p:nvSpPr>
+        <p:spPr>
+          <a:xfrm>
+            <a:off x="3884613" y="8685213"/>
+            <a:ext cx="2971800" cy="458787"/>
+          </a:xfrm>
+          <a:prstGeom prst="rect">
+            <a:avLst/>
+          </a:prstGeom>
+        </p:spPr>
+        <p:txBody>
+          <a:bodyPr vert="horz" lIns="91440" tIns="45720" rIns="91440" bIns="45720" rtlCol="0" anchor="b"/>
+          <a:lstStyle>
+            <a:lvl1pPr algn="r">
+              <a:defRPr sz="1200"/>
+            </a:lvl1pPr>
+          </a:lstStyle>
+          <a:p>
+            <a:fld id="{DB66FE6D-3740-A447-AA55-D681DC2E5264}" type="slidenum">
+              <a:rPr lang="en-US" smtClean="0"/>
+              <a:t>‹#›</a:t>
+            </a:fld>
+            <a:endParaRPr lang="en-US"/>
+          </a:p>
+        </p:txBody>
+      </p:sp>
+    </p:spTree>
+    <p:extLst>
+      <p:ext uri="{BB962C8B-B14F-4D97-AF65-F5344CB8AC3E}">
+        <p14:creationId xmlns:p14="http://schemas.microsoft.com/office/powerpoint/2010/main" val="1200195044"/>
+      </p:ext>
+    </p:extLst>
+  </p:cSld>
+  <p:clrMap bg1="lt1" tx1="dk1" bg2="lt2" tx2="dk2" accent1="accent1" accent2="accent2" accent3="accent3" accent4="accent4" accent5="accent5" accent6="accent6" hlink="hlink" folHlink="folHlink"/>
+  <p:notesStyle>
+    <a:lvl1pPr marL="0" algn="l" defTabSz="914400" rtl="0" eaLnBrk="1" latinLnBrk="0" hangingPunct="1">
+      <a:defRPr sz="1200" kern="1200">
+        <a:solidFill>
+          <a:schemeClr val="tx1"/>
+        </a:solidFill>
+        <a:latin typeface="+mn-lt"/>
+        <a:ea typeface="+mn-ea"/>
+        <a:cs typeface="+mn-cs"/>
+      </a:defRPr>
+    </a:lvl1pPr>
+    <a:lvl2pPr marL="457200" algn="l" defTabSz="914400" rtl="0" eaLnBrk="1" latinLnBrk="0" hangingPunct="1">
+      <a:defRPr sz="1200" kern="1200">
+        <a:solidFill>
+          <a:schemeClr val="tx1"/>
+        </a:solidFill>
+        <a:latin typeface="+mn-lt"/>
+        <a:ea typeface="+mn-ea"/>
+        <a:cs typeface="+mn-cs"/>
+      </a:defRPr>
+    </a:lvl2pPr>
+    <a:lvl3pPr marL="914400" algn="l" defTabSz="914400" rtl="0" eaLnBrk="1" latinLnBrk="0" hangingPunct="1">
+      <a:defRPr sz="1200" kern="1200">
+        <a:solidFill>
+          <a:schemeClr val="tx1"/>
+        </a:solidFill>
+        <a:latin typeface="+mn-lt"/>
+        <a:ea typeface="+mn-ea"/>
+        <a:cs typeface="+mn-cs"/>
+      </a:defRPr>
+    </a:lvl3pPr>
+    <a:lvl4pPr marL="1371600" algn="l" defTabSz="914400" rtl="0" eaLnBrk="1" latinLnBrk="0" hangingPunct="1">
+      <a:defRPr sz="1200" kern="1200">
+        <a:solidFill>
+          <a:schemeClr val="tx1"/>
+        </a:solidFill>
+        <a:latin typeface="+mn-lt"/>
+        <a:ea typeface="+mn-ea"/>
+        <a:cs typeface="+mn-cs"/>
+      </a:defRPr>
+    </a:lvl4pPr>
+    <a:lvl5pPr marL="1828800" algn="l" defTabSz="914400" rtl="0" eaLnBrk="1" latinLnBrk="0" hangingPunct="1">
+      <a:defRPr sz="1200" kern="1200">
+        <a:solidFill>
+          <a:schemeClr val="tx1"/>
+        </a:solidFill>
+        <a:latin typeface="+mn-lt"/>
+        <a:ea typeface="+mn-ea"/>
+        <a:cs typeface="+mn-cs"/>
+      </a:defRPr>
+    </a:lvl5pPr>
+    <a:lvl6pPr marL="2286000" algn="l" defTabSz="914400" rtl="0" eaLnBrk="1" latinLnBrk="0" hangingPunct="1">
+      <a:defRPr sz="1200" kern="1200">
+        <a:solidFill>
+          <a:schemeClr val="tx1"/>
+        </a:solidFill>
+        <a:latin typeface="+mn-lt"/>
+        <a:ea typeface="+mn-ea"/>
+        <a:cs typeface="+mn-cs"/>
+      </a:defRPr>
+    </a:lvl6pPr>
+    <a:lvl7pPr marL="2743200" algn="l" defTabSz="914400" rtl="0" eaLnBrk="1" latinLnBrk="0" hangingPunct="1">
+      <a:defRPr sz="1200" kern="1200">
+        <a:solidFill>
+          <a:schemeClr val="tx1"/>
+        </a:solidFill>
+        <a:latin typeface="+mn-lt"/>
+        <a:ea typeface="+mn-ea"/>
+        <a:cs typeface="+mn-cs"/>
+      </a:defRPr>
+    </a:lvl7pPr>
+    <a:lvl8pPr marL="3200400" algn="l" defTabSz="914400" rtl="0" eaLnBrk="1" latinLnBrk="0" hangingPunct="1">
+      <a:defRPr sz="1200" kern="1200">
+        <a:solidFill>
+          <a:schemeClr val="tx1"/>
+        </a:solidFill>
+        <a:latin typeface="+mn-lt"/>
+        <a:ea typeface="+mn-ea"/>
+        <a:cs typeface="+mn-cs"/>
+      </a:defRPr>
+    </a:lvl8pPr>
+    <a:lvl9pPr marL="3657600" algn="l" defTabSz="914400" rtl="0" eaLnBrk="1" latinLnBrk="0" hangingPunct="1">
+      <a:defRPr sz="1200" kern="1200">
+        <a:solidFill>
+          <a:schemeClr val="tx1"/>
+        </a:solidFill>
+        <a:latin typeface="+mn-lt"/>
+        <a:ea typeface="+mn-ea"/>
+        <a:cs typeface="+mn-cs"/>
+      </a:defRPr>
+    </a:lvl9pPr>
+  </p:notesStyle>
+</p:notesMaster>
+</file>
+
+<file path=ppt/notesSlides/notesSlide1.xml><?xml version="1.0" encoding="utf-8"?>
+<p:notes xmlns:a="http://schemas.openxmlformats.org/drawingml/2006/main" xmlns:r="http://schemas.openxmlformats.org/officeDocument/2006/relationships" xmlns:p="http://schemas.openxmlformats.org/presentationml/2006/main">
+  <p:cSld>
+    <p:spTree>
+      <p:nvGrpSpPr>
+        <p:cNvPr id="1" name=""/>
+        <p:cNvGrpSpPr/>
+        <p:nvPr/>
+      </p:nvGrpSpPr>
+      <p:grpSpPr>
+        <a:xfrm>
+          <a:off x="0" y="0"/>
+          <a:ext cx="0" cy="0"/>
+          <a:chOff x="0" y="0"/>
+          <a:chExt cx="0" cy="0"/>
+        </a:xfrm>
+      </p:grpSpPr>
+      <p:sp>
+        <p:nvSpPr>
+          <p:cNvPr id="2" name="Slide Image Placeholder 1"/>
+          <p:cNvSpPr>
+            <a:spLocks noGrp="1" noRot="1" noChangeAspect="1"/>
+          </p:cNvSpPr>
+          <p:nvPr>
+            <p:ph type="sldImg"/>
+          </p:nvPr>
+        </p:nvSpPr>
+        <p:spPr/>
+      </p:sp>
+      <p:sp>
+        <p:nvSpPr>
+          <p:cNvPr id="3" name="Notes Placeholder 2"/>
+          <p:cNvSpPr>
+            <a:spLocks noGrp="1"/>
+          </p:cNvSpPr>
+          <p:nvPr>
+            <p:ph type="body" idx="1"/>
+          </p:nvPr>
+        </p:nvSpPr>
+        <p:spPr/>
+        <p:txBody>
+          <a:bodyPr/>
+          <a:lstStyle/>
+          <a:p>
+            <a:r>
+              <a:rPr lang="en-US" dirty="0"/>
+              <a:t>We want our models to do well on unseen data.  We replicate this process with cross-validation where we train on one subset and evaluate on another.  Typically there are parameters which affect the generalization gap called hyperparameters.  These are difficult to optimize because we must see how they affect the optimal weights </a:t>
+            </a:r>
+            <a:r>
+              <a:rPr lang="en-US"/>
+              <a:t>through training.</a:t>
+            </a:r>
+            <a:endParaRPr lang="en-US" dirty="0"/>
+          </a:p>
+          <a:p>
+            <a:endParaRPr lang="en-US" dirty="0"/>
+          </a:p>
+          <a:p>
+            <a:endParaRPr lang="en-US" dirty="0"/>
+          </a:p>
+          <a:p>
+            <a:r>
+              <a:rPr lang="en-US" dirty="0"/>
+              <a:t>High-level idea:  Many problems involve training a model to learn a mapping on some labelled data set, and then applying that model on an unseen data set.  Our real goal is performance on the unseen data set, but we are restricted to using the seen data set to learn.  </a:t>
+            </a:r>
+          </a:p>
+          <a:p>
+            <a:endParaRPr lang="en-US" dirty="0"/>
+          </a:p>
+          <a:p>
+            <a:r>
+              <a:rPr lang="en-US" dirty="0"/>
+              <a:t>Cross-validation helps us assess the generalization gap between trained data and new data by replicating the procedure of training on a subset and assessing performance on a data subset not seen during training.</a:t>
+            </a:r>
+          </a:p>
+          <a:p>
+            <a:endParaRPr lang="en-US" dirty="0"/>
+          </a:p>
+          <a:p>
+            <a:r>
+              <a:rPr lang="en-US" dirty="0"/>
+              <a:t>There are often a number of variables – called hyperparameters – that we can modify to decrease the divergence between validation and training performance, likely at the cost of decreases training performance.</a:t>
+            </a:r>
+          </a:p>
+          <a:p>
+            <a:endParaRPr lang="en-US" dirty="0"/>
+          </a:p>
+          <a:p>
+            <a:r>
+              <a:rPr lang="en-US" dirty="0"/>
+              <a:t>Hyperparameters are difficult to tune, because we must model how they affect the optimal set of weights for our model.  We propose to model this relationship with a neural network.</a:t>
+            </a:r>
+          </a:p>
+        </p:txBody>
+      </p:sp>
+      <p:sp>
+        <p:nvSpPr>
+          <p:cNvPr id="4" name="Slide Number Placeholder 3"/>
+          <p:cNvSpPr>
+            <a:spLocks noGrp="1"/>
+          </p:cNvSpPr>
+          <p:nvPr>
+            <p:ph type="sldNum" sz="quarter" idx="10"/>
+          </p:nvPr>
+        </p:nvSpPr>
+        <p:spPr/>
+        <p:txBody>
+          <a:bodyPr/>
+          <a:lstStyle/>
+          <a:p>
+            <a:fld id="{DB66FE6D-3740-A447-AA55-D681DC2E5264}" type="slidenum">
+              <a:rPr lang="en-US" smtClean="0"/>
+              <a:t>1</a:t>
+            </a:fld>
+            <a:endParaRPr lang="en-US"/>
+          </a:p>
+        </p:txBody>
+      </p:sp>
+    </p:spTree>
+    <p:extLst>
+      <p:ext uri="{BB962C8B-B14F-4D97-AF65-F5344CB8AC3E}">
+        <p14:creationId xmlns:p14="http://schemas.microsoft.com/office/powerpoint/2010/main" val="2408585408"/>
+      </p:ext>
+    </p:extLst>
+  </p:cSld>
+  <p:clrMapOvr>
+    <a:masterClrMapping/>
+  </p:clrMapOvr>
+</p:notes>
+</file>
+
+<file path=ppt/notesSlides/notesSlide2.xml><?xml version="1.0" encoding="utf-8"?>
+<p:notes xmlns:a="http://schemas.openxmlformats.org/drawingml/2006/main" xmlns:r="http://schemas.openxmlformats.org/officeDocument/2006/relationships" xmlns:p="http://schemas.openxmlformats.org/presentationml/2006/main">
+  <p:cSld>
+    <p:spTree>
+      <p:nvGrpSpPr>
+        <p:cNvPr id="1" name=""/>
+        <p:cNvGrpSpPr/>
+        <p:nvPr/>
+      </p:nvGrpSpPr>
+      <p:grpSpPr>
+        <a:xfrm>
+          <a:off x="0" y="0"/>
+          <a:ext cx="0" cy="0"/>
+          <a:chOff x="0" y="0"/>
+          <a:chExt cx="0" cy="0"/>
+        </a:xfrm>
+      </p:grpSpPr>
+      <p:sp>
+        <p:nvSpPr>
+          <p:cNvPr id="2" name="Slide Image Placeholder 1"/>
+          <p:cNvSpPr>
+            <a:spLocks noGrp="1" noRot="1" noChangeAspect="1"/>
+          </p:cNvSpPr>
+          <p:nvPr>
+            <p:ph type="sldImg"/>
+          </p:nvPr>
+        </p:nvSpPr>
+        <p:spPr/>
+      </p:sp>
+      <p:sp>
+        <p:nvSpPr>
+          <p:cNvPr id="3" name="Notes Placeholder 2"/>
+          <p:cNvSpPr>
+            <a:spLocks noGrp="1"/>
+          </p:cNvSpPr>
+          <p:nvPr>
+            <p:ph type="body" idx="1"/>
+          </p:nvPr>
+        </p:nvSpPr>
+        <p:spPr/>
+        <p:txBody>
+          <a:bodyPr/>
+          <a:lstStyle/>
+          <a:p>
+            <a:r>
+              <a:rPr lang="en-US" dirty="0" err="1"/>
+              <a:t>Bilevel</a:t>
+            </a:r>
+            <a:r>
+              <a:rPr lang="en-US" dirty="0"/>
+              <a:t> optimization is a fairly general class of problems, that are often difficult to solve. I like to think of them as a game between a leader and a follower.  For example, a GAN where </a:t>
+            </a:r>
+            <a:r>
+              <a:rPr lang="en-US" dirty="0" err="1"/>
+              <a:t>L_v</a:t>
+            </a:r>
+            <a:r>
+              <a:rPr lang="en-US" dirty="0"/>
+              <a:t> = </a:t>
+            </a:r>
+            <a:r>
+              <a:rPr lang="en-US" dirty="0" err="1"/>
+              <a:t>L_t</a:t>
+            </a:r>
+            <a:r>
+              <a:rPr lang="en-US" dirty="0"/>
+              <a:t> = V.</a:t>
+            </a:r>
+          </a:p>
+          <a:p>
+            <a:endParaRPr lang="en-US" dirty="0"/>
+          </a:p>
+          <a:p>
+            <a:r>
+              <a:rPr lang="en-US" dirty="0"/>
+              <a:t>The </a:t>
+            </a:r>
+            <a:r>
+              <a:rPr lang="en-US" dirty="0" err="1"/>
+              <a:t>argmin_w</a:t>
+            </a:r>
+            <a:r>
+              <a:rPr lang="en-US" dirty="0"/>
+              <a:t>(…) is a function of the hyperparameters, denoted the best-response function in the context of game-theory.  If we can differentiate through </a:t>
+            </a:r>
+            <a:r>
+              <a:rPr lang="en-US" dirty="0" err="1"/>
+              <a:t>L_v</a:t>
+            </a:r>
+            <a:r>
+              <a:rPr lang="en-US" dirty="0"/>
+              <a:t> and the best-response, then we could do gradient descent on the hyperparameters.</a:t>
+            </a:r>
+          </a:p>
+          <a:p>
+            <a:endParaRPr lang="en-US" dirty="0"/>
+          </a:p>
+          <a:p>
+            <a:r>
+              <a:rPr lang="en-US" dirty="0"/>
+              <a:t>Best-response functions are common for solutions in game theory.  Here bi-level optimizations correspond to </a:t>
+            </a:r>
+            <a:r>
+              <a:rPr lang="en-US" dirty="0" err="1"/>
+              <a:t>stackelberg</a:t>
+            </a:r>
+            <a:r>
+              <a:rPr lang="en-US" dirty="0"/>
+              <a:t> competitions, but best-response functions are </a:t>
+            </a:r>
+            <a:r>
+              <a:rPr lang="en-US" dirty="0" err="1"/>
+              <a:t>usefull</a:t>
+            </a:r>
+            <a:r>
+              <a:rPr lang="en-US" dirty="0"/>
+              <a:t> in basically any game.  Some examples include cooperative/non-cooperative games, symmetric/asymmetric games (ex. soccer vs ), zero-sum/non-zero-sum games (chess or war), simultaneous/sequential games, perfect information/imperfect information, discrete/continuous games, many-player games, or meta-games like mechanism design.  Partially observed stochastic games are one of the most general.</a:t>
+            </a:r>
+          </a:p>
+        </p:txBody>
+      </p:sp>
+      <p:sp>
+        <p:nvSpPr>
+          <p:cNvPr id="4" name="Slide Number Placeholder 3"/>
+          <p:cNvSpPr>
+            <a:spLocks noGrp="1"/>
+          </p:cNvSpPr>
+          <p:nvPr>
+            <p:ph type="sldNum" sz="quarter" idx="10"/>
+          </p:nvPr>
+        </p:nvSpPr>
+        <p:spPr/>
+        <p:txBody>
+          <a:bodyPr/>
+          <a:lstStyle/>
+          <a:p>
+            <a:fld id="{DB66FE6D-3740-A447-AA55-D681DC2E5264}" type="slidenum">
+              <a:rPr lang="en-US" smtClean="0"/>
+              <a:t>2</a:t>
+            </a:fld>
+            <a:endParaRPr lang="en-US"/>
+          </a:p>
+        </p:txBody>
+      </p:sp>
+    </p:spTree>
+    <p:extLst>
+      <p:ext uri="{BB962C8B-B14F-4D97-AF65-F5344CB8AC3E}">
+        <p14:creationId xmlns:p14="http://schemas.microsoft.com/office/powerpoint/2010/main" val="2283419725"/>
+      </p:ext>
+    </p:extLst>
+  </p:cSld>
+  <p:clrMapOvr>
+    <a:masterClrMapping/>
+  </p:clrMapOvr>
+</p:notes>
+</file>
+
+<file path=ppt/notesSlides/notesSlide3.xml><?xml version="1.0" encoding="utf-8"?>
+<p:notes xmlns:a="http://schemas.openxmlformats.org/drawingml/2006/main" xmlns:r="http://schemas.openxmlformats.org/officeDocument/2006/relationships" xmlns:p="http://schemas.openxmlformats.org/presentationml/2006/main">
+  <p:cSld>
+    <p:spTree>
+      <p:nvGrpSpPr>
+        <p:cNvPr id="1" name=""/>
+        <p:cNvGrpSpPr/>
+        <p:nvPr/>
+      </p:nvGrpSpPr>
+      <p:grpSpPr>
+        <a:xfrm>
+          <a:off x="0" y="0"/>
+          <a:ext cx="0" cy="0"/>
+          <a:chOff x="0" y="0"/>
+          <a:chExt cx="0" cy="0"/>
+        </a:xfrm>
+      </p:grpSpPr>
+      <p:sp>
+        <p:nvSpPr>
+          <p:cNvPr id="2" name="Slide Image Placeholder 1"/>
+          <p:cNvSpPr>
+            <a:spLocks noGrp="1" noRot="1" noChangeAspect="1"/>
+          </p:cNvSpPr>
+          <p:nvPr>
+            <p:ph type="sldImg"/>
+          </p:nvPr>
+        </p:nvSpPr>
+        <p:spPr/>
+      </p:sp>
+      <p:sp>
+        <p:nvSpPr>
+          <p:cNvPr id="3" name="Notes Placeholder 2"/>
+          <p:cNvSpPr>
+            <a:spLocks noGrp="1"/>
+          </p:cNvSpPr>
+          <p:nvPr>
+            <p:ph type="body" idx="1"/>
+          </p:nvPr>
+        </p:nvSpPr>
+        <p:spPr/>
+        <p:txBody>
+          <a:bodyPr/>
+          <a:lstStyle/>
+          <a:p>
+            <a:r>
+              <a:rPr lang="en-US" dirty="0"/>
+              <a:t>Lets learn the best-response function!  We will save effort by amortizing the optimization, which means trying to share work between the different optimizations.  It would be best if we could simultaneously solve all points we are interested in, maximally sharing effort between searches.</a:t>
+            </a:r>
+          </a:p>
+          <a:p>
+            <a:endParaRPr lang="en-US" dirty="0"/>
+          </a:p>
+          <a:p>
+            <a:r>
+              <a:rPr lang="en-US" dirty="0"/>
+              <a:t>We do this by sampling hyperparameters and training a neural network to output optimal weights.</a:t>
+            </a:r>
+          </a:p>
+        </p:txBody>
+      </p:sp>
+      <p:sp>
+        <p:nvSpPr>
+          <p:cNvPr id="4" name="Slide Number Placeholder 3"/>
+          <p:cNvSpPr>
+            <a:spLocks noGrp="1"/>
+          </p:cNvSpPr>
+          <p:nvPr>
+            <p:ph type="sldNum" sz="quarter" idx="10"/>
+          </p:nvPr>
+        </p:nvSpPr>
+        <p:spPr/>
+        <p:txBody>
+          <a:bodyPr/>
+          <a:lstStyle/>
+          <a:p>
+            <a:fld id="{DB66FE6D-3740-A447-AA55-D681DC2E5264}" type="slidenum">
+              <a:rPr lang="en-US" smtClean="0"/>
+              <a:t>3</a:t>
+            </a:fld>
+            <a:endParaRPr lang="en-US"/>
+          </a:p>
+        </p:txBody>
+      </p:sp>
+    </p:spTree>
+    <p:extLst>
+      <p:ext uri="{BB962C8B-B14F-4D97-AF65-F5344CB8AC3E}">
+        <p14:creationId xmlns:p14="http://schemas.microsoft.com/office/powerpoint/2010/main" val="461951989"/>
+      </p:ext>
+    </p:extLst>
+  </p:cSld>
+  <p:clrMapOvr>
+    <a:masterClrMapping/>
+  </p:clrMapOvr>
+</p:notes>
+</file>
+
+<file path=ppt/notesSlides/notesSlide4.xml><?xml version="1.0" encoding="utf-8"?>
+<p:notes xmlns:a="http://schemas.openxmlformats.org/drawingml/2006/main" xmlns:r="http://schemas.openxmlformats.org/officeDocument/2006/relationships" xmlns:p="http://schemas.openxmlformats.org/presentationml/2006/main">
+  <p:cSld>
+    <p:spTree>
+      <p:nvGrpSpPr>
+        <p:cNvPr id="1" name=""/>
+        <p:cNvGrpSpPr/>
+        <p:nvPr/>
+      </p:nvGrpSpPr>
+      <p:grpSpPr>
+        <a:xfrm>
+          <a:off x="0" y="0"/>
+          <a:ext cx="0" cy="0"/>
+          <a:chOff x="0" y="0"/>
+          <a:chExt cx="0" cy="0"/>
+        </a:xfrm>
+      </p:grpSpPr>
+      <p:sp>
+        <p:nvSpPr>
+          <p:cNvPr id="2" name="Slide Image Placeholder 1"/>
+          <p:cNvSpPr>
+            <a:spLocks noGrp="1" noRot="1" noChangeAspect="1"/>
+          </p:cNvSpPr>
+          <p:nvPr>
+            <p:ph type="sldImg"/>
+          </p:nvPr>
+        </p:nvSpPr>
+        <p:spPr/>
+      </p:sp>
+      <p:sp>
+        <p:nvSpPr>
+          <p:cNvPr id="3" name="Notes Placeholder 2"/>
+          <p:cNvSpPr>
+            <a:spLocks noGrp="1"/>
+          </p:cNvSpPr>
+          <p:nvPr>
+            <p:ph type="body" idx="1"/>
+          </p:nvPr>
+        </p:nvSpPr>
+        <p:spPr/>
+        <p:txBody>
+          <a:bodyPr/>
+          <a:lstStyle/>
+          <a:p>
+            <a:r>
+              <a:rPr lang="en-US" dirty="0"/>
+              <a:t>It can be difficult to learn the best-response everywhere. Imagine we have a limited capacity network.</a:t>
+            </a:r>
+          </a:p>
+          <a:p>
+            <a:r>
+              <a:rPr lang="en-US" dirty="0"/>
+              <a:t> </a:t>
+            </a:r>
+          </a:p>
+          <a:p>
+            <a:r>
+              <a:rPr lang="en-US" dirty="0"/>
+              <a:t>Also, it can be incredibly wasteful.  We only have to learn it in in some neighborhood along our gradient descent path to a local optima.</a:t>
+            </a:r>
+          </a:p>
+          <a:p>
+            <a:endParaRPr lang="en-US" dirty="0"/>
+          </a:p>
+          <a:p>
+            <a:r>
+              <a:rPr lang="en-US" dirty="0"/>
+              <a:t>Lets introduce a “current hyperparameters selection” and conditional training distribution.  The current hyperparameter represents where we are in our search, and the conditional training distribution is some small neighborhood around our current hyperparameter.  Maybe a very tight Gaussian.</a:t>
+            </a:r>
+          </a:p>
+          <a:p>
+            <a:endParaRPr lang="en-US" dirty="0"/>
+          </a:p>
+          <a:p>
+            <a:r>
+              <a:rPr lang="en-US" dirty="0"/>
+              <a:t>Thus, we hope to learn a local approximation to the best-response, take a small step, then re-update the local approximation. &lt;JUMP TO NEXT PAGE THEN JUMP BACK&gt;</a:t>
+            </a:r>
+          </a:p>
+          <a:p>
+            <a:endParaRPr lang="en-US" dirty="0"/>
+          </a:p>
+          <a:p>
+            <a:r>
+              <a:rPr lang="en-US" dirty="0"/>
+              <a:t>The conditional training distribution is hard to choose, especially in high dimensions.  In practice, it was sufficient to just use the updates as noise, but this has no guarantees.</a:t>
+            </a:r>
+          </a:p>
+        </p:txBody>
+      </p:sp>
+      <p:sp>
+        <p:nvSpPr>
+          <p:cNvPr id="4" name="Slide Number Placeholder 3"/>
+          <p:cNvSpPr>
+            <a:spLocks noGrp="1"/>
+          </p:cNvSpPr>
+          <p:nvPr>
+            <p:ph type="sldNum" sz="quarter" idx="10"/>
+          </p:nvPr>
+        </p:nvSpPr>
+        <p:spPr/>
+        <p:txBody>
+          <a:bodyPr/>
+          <a:lstStyle/>
+          <a:p>
+            <a:fld id="{DB66FE6D-3740-A447-AA55-D681DC2E5264}" type="slidenum">
+              <a:rPr lang="en-US" smtClean="0"/>
+              <a:t>5</a:t>
+            </a:fld>
+            <a:endParaRPr lang="en-US"/>
+          </a:p>
+        </p:txBody>
+      </p:sp>
+    </p:spTree>
+    <p:extLst>
+      <p:ext uri="{BB962C8B-B14F-4D97-AF65-F5344CB8AC3E}">
+        <p14:creationId xmlns:p14="http://schemas.microsoft.com/office/powerpoint/2010/main" val="3743336597"/>
+      </p:ext>
+    </p:extLst>
+  </p:cSld>
+  <p:clrMapOvr>
+    <a:masterClrMapping/>
+  </p:clrMapOvr>
+</p:notes>
+</file>
+
+<file path=ppt/notesSlides/notesSlide5.xml><?xml version="1.0" encoding="utf-8"?>
+<p:notes xmlns:a="http://schemas.openxmlformats.org/drawingml/2006/main" xmlns:r="http://schemas.openxmlformats.org/officeDocument/2006/relationships" xmlns:p="http://schemas.openxmlformats.org/presentationml/2006/main">
+  <p:cSld>
+    <p:spTree>
+      <p:nvGrpSpPr>
+        <p:cNvPr id="1" name=""/>
+        <p:cNvGrpSpPr/>
+        <p:nvPr/>
+      </p:nvGrpSpPr>
+      <p:grpSpPr>
+        <a:xfrm>
+          <a:off x="0" y="0"/>
+          <a:ext cx="0" cy="0"/>
+          <a:chOff x="0" y="0"/>
+          <a:chExt cx="0" cy="0"/>
+        </a:xfrm>
+      </p:grpSpPr>
+      <p:sp>
+        <p:nvSpPr>
+          <p:cNvPr id="2" name="Slide Image Placeholder 1"/>
+          <p:cNvSpPr>
+            <a:spLocks noGrp="1" noRot="1" noChangeAspect="1"/>
+          </p:cNvSpPr>
+          <p:nvPr>
+            <p:ph type="sldImg"/>
+          </p:nvPr>
+        </p:nvSpPr>
+        <p:spPr/>
+      </p:sp>
+      <p:sp>
+        <p:nvSpPr>
+          <p:cNvPr id="3" name="Notes Placeholder 2"/>
+          <p:cNvSpPr>
+            <a:spLocks noGrp="1"/>
+          </p:cNvSpPr>
+          <p:nvPr>
+            <p:ph type="body" idx="1"/>
+          </p:nvPr>
+        </p:nvSpPr>
+        <p:spPr/>
+        <p:txBody>
+          <a:bodyPr/>
+          <a:lstStyle/>
+          <a:p>
+            <a:endParaRPr lang="en-US" dirty="0"/>
+          </a:p>
+        </p:txBody>
+      </p:sp>
+      <p:sp>
+        <p:nvSpPr>
+          <p:cNvPr id="4" name="Slide Number Placeholder 3"/>
+          <p:cNvSpPr>
+            <a:spLocks noGrp="1"/>
+          </p:cNvSpPr>
+          <p:nvPr>
+            <p:ph type="sldNum" sz="quarter" idx="10"/>
+          </p:nvPr>
+        </p:nvSpPr>
+        <p:spPr/>
+        <p:txBody>
+          <a:bodyPr/>
+          <a:lstStyle/>
+          <a:p>
+            <a:fld id="{DB66FE6D-3740-A447-AA55-D681DC2E5264}" type="slidenum">
+              <a:rPr lang="en-US" smtClean="0"/>
+              <a:t>6</a:t>
+            </a:fld>
+            <a:endParaRPr lang="en-US"/>
+          </a:p>
+        </p:txBody>
+      </p:sp>
+    </p:spTree>
+    <p:extLst>
+      <p:ext uri="{BB962C8B-B14F-4D97-AF65-F5344CB8AC3E}">
+        <p14:creationId xmlns:p14="http://schemas.microsoft.com/office/powerpoint/2010/main" val="3914323633"/>
+      </p:ext>
+    </p:extLst>
+  </p:cSld>
+  <p:clrMapOvr>
+    <a:masterClrMapping/>
+  </p:clrMapOvr>
+</p:notes>
+</file>
+
+<file path=ppt/notesSlides/notesSlide6.xml><?xml version="1.0" encoding="utf-8"?>
+<p:notes xmlns:a="http://schemas.openxmlformats.org/drawingml/2006/main" xmlns:r="http://schemas.openxmlformats.org/officeDocument/2006/relationships" xmlns:p="http://schemas.openxmlformats.org/presentationml/2006/main">
+  <p:cSld>
+    <p:spTree>
+      <p:nvGrpSpPr>
+        <p:cNvPr id="1" name=""/>
+        <p:cNvGrpSpPr/>
+        <p:nvPr/>
+      </p:nvGrpSpPr>
+      <p:grpSpPr>
+        <a:xfrm>
+          <a:off x="0" y="0"/>
+          <a:ext cx="0" cy="0"/>
+          <a:chOff x="0" y="0"/>
+          <a:chExt cx="0" cy="0"/>
+        </a:xfrm>
+      </p:grpSpPr>
+      <p:sp>
+        <p:nvSpPr>
+          <p:cNvPr id="2" name="Slide Image Placeholder 1"/>
+          <p:cNvSpPr>
+            <a:spLocks noGrp="1" noRot="1" noChangeAspect="1"/>
+          </p:cNvSpPr>
+          <p:nvPr>
+            <p:ph type="sldImg"/>
+          </p:nvPr>
+        </p:nvSpPr>
+        <p:spPr/>
+      </p:sp>
+      <p:sp>
+        <p:nvSpPr>
+          <p:cNvPr id="3" name="Notes Placeholder 2"/>
+          <p:cNvSpPr>
+            <a:spLocks noGrp="1"/>
+          </p:cNvSpPr>
+          <p:nvPr>
+            <p:ph type="body" idx="1"/>
+          </p:nvPr>
+        </p:nvSpPr>
+        <p:spPr/>
+        <p:txBody>
+          <a:bodyPr/>
+          <a:lstStyle/>
+          <a:p>
+            <a:r>
+              <a:rPr lang="en-US" dirty="0"/>
+              <a:t>Note that this uses special structure found in prediction functions, and that the weights are just some arbitrary parametrization anyways.</a:t>
+            </a:r>
+          </a:p>
+        </p:txBody>
+      </p:sp>
+      <p:sp>
+        <p:nvSpPr>
+          <p:cNvPr id="4" name="Slide Number Placeholder 3"/>
+          <p:cNvSpPr>
+            <a:spLocks noGrp="1"/>
+          </p:cNvSpPr>
+          <p:nvPr>
+            <p:ph type="sldNum" sz="quarter" idx="10"/>
+          </p:nvPr>
+        </p:nvSpPr>
+        <p:spPr/>
+        <p:txBody>
+          <a:bodyPr/>
+          <a:lstStyle/>
+          <a:p>
+            <a:fld id="{DB66FE6D-3740-A447-AA55-D681DC2E5264}" type="slidenum">
+              <a:rPr lang="en-US" smtClean="0"/>
+              <a:t>10</a:t>
+            </a:fld>
+            <a:endParaRPr lang="en-US"/>
+          </a:p>
+        </p:txBody>
+      </p:sp>
+    </p:spTree>
+    <p:extLst>
+      <p:ext uri="{BB962C8B-B14F-4D97-AF65-F5344CB8AC3E}">
+        <p14:creationId xmlns:p14="http://schemas.microsoft.com/office/powerpoint/2010/main" val="394773880"/>
+      </p:ext>
+    </p:extLst>
+  </p:cSld>
+  <p:clrMapOvr>
+    <a:masterClrMapping/>
+  </p:clrMapOvr>
+</p:notes>
+</file>
+
+<file path=ppt/notesSlides/notesSlide7.xml><?xml version="1.0" encoding="utf-8"?>
+<p:notes xmlns:a="http://schemas.openxmlformats.org/drawingml/2006/main" xmlns:r="http://schemas.openxmlformats.org/officeDocument/2006/relationships" xmlns:p="http://schemas.openxmlformats.org/presentationml/2006/main">
+  <p:cSld>
+    <p:spTree>
+      <p:nvGrpSpPr>
+        <p:cNvPr id="1" name=""/>
+        <p:cNvGrpSpPr/>
+        <p:nvPr/>
+      </p:nvGrpSpPr>
+      <p:grpSpPr>
+        <a:xfrm>
+          <a:off x="0" y="0"/>
+          <a:ext cx="0" cy="0"/>
+          <a:chOff x="0" y="0"/>
+          <a:chExt cx="0" cy="0"/>
+        </a:xfrm>
+      </p:grpSpPr>
+      <p:sp>
+        <p:nvSpPr>
+          <p:cNvPr id="2" name="Slide Image Placeholder 1"/>
+          <p:cNvSpPr>
+            <a:spLocks noGrp="1" noRot="1" noChangeAspect="1"/>
+          </p:cNvSpPr>
+          <p:nvPr>
+            <p:ph type="sldImg"/>
+          </p:nvPr>
+        </p:nvSpPr>
+        <p:spPr/>
+      </p:sp>
+      <p:sp>
+        <p:nvSpPr>
+          <p:cNvPr id="3" name="Notes Placeholder 2"/>
+          <p:cNvSpPr>
+            <a:spLocks noGrp="1"/>
+          </p:cNvSpPr>
+          <p:nvPr>
+            <p:ph type="body" idx="1"/>
+          </p:nvPr>
+        </p:nvSpPr>
+        <p:spPr/>
+        <p:txBody>
+          <a:bodyPr/>
+          <a:lstStyle/>
+          <a:p>
+            <a:endParaRPr lang="en-US" dirty="0"/>
+          </a:p>
+        </p:txBody>
+      </p:sp>
+      <p:sp>
+        <p:nvSpPr>
+          <p:cNvPr id="4" name="Slide Number Placeholder 3"/>
+          <p:cNvSpPr>
+            <a:spLocks noGrp="1"/>
+          </p:cNvSpPr>
+          <p:nvPr>
+            <p:ph type="sldNum" sz="quarter" idx="10"/>
+          </p:nvPr>
+        </p:nvSpPr>
+        <p:spPr/>
+        <p:txBody>
+          <a:bodyPr/>
+          <a:lstStyle/>
+          <a:p>
+            <a:fld id="{DB66FE6D-3740-A447-AA55-D681DC2E5264}" type="slidenum">
+              <a:rPr lang="en-US" smtClean="0"/>
+              <a:t>11</a:t>
+            </a:fld>
+            <a:endParaRPr lang="en-US"/>
+          </a:p>
+        </p:txBody>
+      </p:sp>
+    </p:spTree>
+    <p:extLst>
+      <p:ext uri="{BB962C8B-B14F-4D97-AF65-F5344CB8AC3E}">
+        <p14:creationId xmlns:p14="http://schemas.microsoft.com/office/powerpoint/2010/main" val="2594539551"/>
+      </p:ext>
+    </p:extLst>
+  </p:cSld>
+  <p:clrMapOvr>
+    <a:masterClrMapping/>
+  </p:clrMapOvr>
+</p:notes>
 </file>
 
 <file path=ppt/slideLayouts/slideLayout1.xml><?xml version="1.0" encoding="utf-8"?>
@@ -475,7 +1608,7 @@
             <a:fld id="{5923F103-BC34-4FE4-A40E-EDDEECFDA5D0}" type="datetimeFigureOut">
               <a:rPr lang="en-US" smtClean="0"/>
               <a:pPr/>
-              <a:t>3/12/18</a:t>
+              <a:t>3/15/18</a:t>
             </a:fld>
             <a:endParaRPr lang="en-US" dirty="0"/>
           </a:p>
@@ -1564,7 +2697,7 @@
           <a:p>
             <a:fld id="{2BE451C3-0FF4-47C4-B829-773ADF60F88C}" type="datetimeFigureOut">
               <a:rPr lang="en-US" smtClean="0"/>
-              <a:t>3/12/18</a:t>
+              <a:t>3/15/18</a:t>
             </a:fld>
             <a:endParaRPr lang="en-US" dirty="0"/>
           </a:p>
@@ -2546,7 +3679,7 @@
           <a:p>
             <a:fld id="{2BE451C3-0FF4-47C4-B829-773ADF60F88C}" type="datetimeFigureOut">
               <a:rPr lang="en-US" smtClean="0"/>
-              <a:t>3/12/18</a:t>
+              <a:t>3/15/18</a:t>
             </a:fld>
             <a:endParaRPr lang="en-US" dirty="0"/>
           </a:p>
@@ -3682,7 +4815,7 @@
           <a:p>
             <a:fld id="{2BE451C3-0FF4-47C4-B829-773ADF60F88C}" type="datetimeFigureOut">
               <a:rPr lang="en-US" smtClean="0"/>
-              <a:t>3/12/18</a:t>
+              <a:t>3/15/18</a:t>
             </a:fld>
             <a:endParaRPr lang="en-US" dirty="0"/>
           </a:p>
@@ -4717,7 +5850,7 @@
           <a:p>
             <a:fld id="{2BE451C3-0FF4-47C4-B829-773ADF60F88C}" type="datetimeFigureOut">
               <a:rPr lang="en-US" smtClean="0"/>
-              <a:t>3/12/18</a:t>
+              <a:t>3/15/18</a:t>
             </a:fld>
             <a:endParaRPr lang="en-US" dirty="0"/>
           </a:p>
@@ -5379,7 +6512,7 @@
           <a:p>
             <a:fld id="{2BE451C3-0FF4-47C4-B829-773ADF60F88C}" type="datetimeFigureOut">
               <a:rPr lang="en-US" smtClean="0"/>
-              <a:t>3/12/18</a:t>
+              <a:t>3/15/18</a:t>
             </a:fld>
             <a:endParaRPr lang="en-US" dirty="0"/>
           </a:p>
@@ -6242,7 +7375,7 @@
           <a:p>
             <a:fld id="{2BE451C3-0FF4-47C4-B829-773ADF60F88C}" type="datetimeFigureOut">
               <a:rPr lang="en-US" smtClean="0"/>
-              <a:t>3/12/18</a:t>
+              <a:t>3/15/18</a:t>
             </a:fld>
             <a:endParaRPr lang="en-US" dirty="0"/>
           </a:p>
@@ -6434,7 +7567,7 @@
           <a:p>
             <a:fld id="{53086D93-FCAC-47E0-A2EE-787E62CA814C}" type="datetimeFigureOut">
               <a:rPr lang="en-US" smtClean="0"/>
-              <a:t>3/12/18</a:t>
+              <a:t>3/15/18</a:t>
             </a:fld>
             <a:endParaRPr lang="en-US" dirty="0"/>
           </a:p>
@@ -7407,7 +8540,7 @@
           <a:p>
             <a:fld id="{CDA879A6-0FD0-4734-A311-86BFCA472E6E}" type="datetimeFigureOut">
               <a:rPr lang="en-US" smtClean="0"/>
-              <a:t>3/12/18</a:t>
+              <a:t>3/15/18</a:t>
             </a:fld>
             <a:endParaRPr lang="en-US" dirty="0"/>
           </a:p>
@@ -7619,7 +8752,7 @@
           <a:p>
             <a:fld id="{19C9CA7B-DFD4-44B5-8C60-D14B8CD1FB59}" type="datetimeFigureOut">
               <a:rPr lang="en-US" smtClean="0"/>
-              <a:t>3/12/18</a:t>
+              <a:t>3/15/18</a:t>
             </a:fld>
             <a:endParaRPr lang="en-US" dirty="0"/>
           </a:p>
@@ -8654,7 +9787,7 @@
           <a:p>
             <a:fld id="{F34E6425-0181-43F2-84FC-787E803FD2F8}" type="datetimeFigureOut">
               <a:rPr lang="en-US" smtClean="0"/>
-              <a:t>3/12/18</a:t>
+              <a:t>3/15/18</a:t>
             </a:fld>
             <a:endParaRPr lang="en-US" dirty="0"/>
           </a:p>
@@ -8927,7 +10060,7 @@
           <a:p>
             <a:fld id="{3BDB8791-F1B0-41E7-B7FD-A781E65C4266}" type="datetimeFigureOut">
               <a:rPr lang="en-US" smtClean="0"/>
-              <a:t>3/12/18</a:t>
+              <a:t>3/15/18</a:t>
             </a:fld>
             <a:endParaRPr lang="en-US" dirty="0"/>
           </a:p>
@@ -9338,7 +10471,7 @@
           <a:p>
             <a:fld id="{5FDD63B2-E120-4ED8-B27B-C685F510A5FE}" type="datetimeFigureOut">
               <a:rPr lang="en-US" smtClean="0"/>
-              <a:t>3/12/18</a:t>
+              <a:t>3/15/18</a:t>
             </a:fld>
             <a:endParaRPr lang="en-US" dirty="0"/>
           </a:p>
@@ -9466,7 +10599,7 @@
           <a:p>
             <a:fld id="{7AA18ACC-A947-437B-A130-35BD54FDF1E9}" type="datetimeFigureOut">
               <a:rPr lang="en-US" smtClean="0"/>
-              <a:t>3/12/18</a:t>
+              <a:t>3/15/18</a:t>
             </a:fld>
             <a:endParaRPr lang="en-US" dirty="0"/>
           </a:p>
@@ -9562,7 +10695,7 @@
           <a:p>
             <a:fld id="{7C8D7E02-BCB8-4D50-A234-369438C08659}" type="datetimeFigureOut">
               <a:rPr lang="en-US" smtClean="0"/>
-              <a:t>3/12/18</a:t>
+              <a:t>3/15/18</a:t>
             </a:fld>
             <a:endParaRPr lang="en-US" dirty="0"/>
           </a:p>
@@ -10644,7 +11777,7 @@
           <a:p>
             <a:fld id="{76E86A4C-8E40-4F87-A4F0-01A0687C5742}" type="datetimeFigureOut">
               <a:rPr lang="en-US" smtClean="0"/>
-              <a:t>3/12/18</a:t>
+              <a:t>3/15/18</a:t>
             </a:fld>
             <a:endParaRPr lang="en-US" dirty="0"/>
           </a:p>
@@ -11753,7 +12886,7 @@
           <a:p>
             <a:fld id="{35E72C73-2D91-4E12-BA25-F0AA0C03599B}" type="datetimeFigureOut">
               <a:rPr lang="en-US" smtClean="0"/>
-              <a:t>3/12/18</a:t>
+              <a:t>3/15/18</a:t>
             </a:fld>
             <a:endParaRPr lang="en-US" dirty="0"/>
           </a:p>
@@ -12751,7 +13884,7 @@
           <a:p>
             <a:fld id="{2BE451C3-0FF4-47C4-B829-773ADF60F88C}" type="datetimeFigureOut">
               <a:rPr lang="en-US" smtClean="0"/>
-              <a:t>3/12/18</a:t>
+              <a:t>3/15/18</a:t>
             </a:fld>
             <a:endParaRPr lang="en-US" dirty="0"/>
           </a:p>
@@ -13365,8 +14498,8 @@
         </p:nvSpPr>
         <p:spPr>
           <a:xfrm>
-            <a:off x="1154955" y="3816038"/>
-            <a:ext cx="8825658" cy="861420"/>
+            <a:off x="1154955" y="3816037"/>
+            <a:ext cx="8825658" cy="2384737"/>
           </a:xfrm>
         </p:spPr>
         <p:txBody>
@@ -13392,6 +14525,23 @@
                 </a:solidFill>
               </a:rPr>
               <a:t>&amp; David Duvenaud</a:t>
+            </a:r>
+          </a:p>
+          <a:p>
+            <a:endParaRPr lang="en-US" dirty="0">
+              <a:solidFill>
+                <a:schemeClr val="bg1"/>
+              </a:solidFill>
+            </a:endParaRPr>
+          </a:p>
+          <a:p>
+            <a:r>
+              <a:rPr lang="en-US" dirty="0">
+                <a:solidFill>
+                  <a:schemeClr val="bg1"/>
+                </a:solidFill>
+              </a:rPr>
+              <a:t>University of Toronto</a:t>
             </a:r>
           </a:p>
         </p:txBody>
@@ -13411,7 +14561,7 @@
           <p:nvPr/>
         </p:nvPicPr>
         <p:blipFill>
-          <a:blip r:embed="rId2"/>
+          <a:blip r:embed="rId3"/>
           <a:stretch>
             <a:fillRect/>
           </a:stretch>
@@ -13500,39 +14650,247 @@
             <p:ph idx="1"/>
           </p:nvPr>
         </p:nvSpPr>
+        <p:spPr>
+          <a:xfrm>
+            <a:off x="575091" y="2558895"/>
+            <a:ext cx="10509222" cy="3797300"/>
+          </a:xfrm>
+        </p:spPr>
+        <p:txBody>
+          <a:bodyPr/>
+          <a:lstStyle/>
+          <a:p>
+            <a:r>
+              <a:rPr lang="en-US" dirty="0"/>
+              <a:t>Learning how the weights vary </a:t>
+            </a:r>
+            <a:r>
+              <a:rPr lang="en-US" dirty="0" err="1"/>
+              <a:t>w.r.t</a:t>
+            </a:r>
+            <a:r>
+              <a:rPr lang="en-US" dirty="0"/>
+              <a:t>. hyperparameters can be expensive  - consider a net with 10,000,000 weights and 10 hyperparameters.  Instead learn how the policy/predictions vary </a:t>
+            </a:r>
+            <a:r>
+              <a:rPr lang="en-US" dirty="0" err="1"/>
+              <a:t>w.r.t</a:t>
+            </a:r>
+            <a:r>
+              <a:rPr lang="en-US" dirty="0"/>
+              <a:t> hyperparameters.</a:t>
+            </a:r>
+          </a:p>
+          <a:p>
+            <a:endParaRPr lang="en-US" dirty="0"/>
+          </a:p>
+          <a:p>
+            <a:endParaRPr lang="en-US" dirty="0"/>
+          </a:p>
+          <a:p>
+            <a:endParaRPr lang="en-US" dirty="0"/>
+          </a:p>
+          <a:p>
+            <a:r>
+              <a:rPr lang="en-US" dirty="0"/>
+              <a:t>Try optimizing other hyperparameters</a:t>
+            </a:r>
+          </a:p>
+          <a:p>
+            <a:pPr marL="0" indent="0">
+              <a:buNone/>
+            </a:pPr>
+            <a:endParaRPr lang="en-US" dirty="0"/>
+          </a:p>
+          <a:p>
+            <a:pPr marL="0" indent="0">
+              <a:buNone/>
+            </a:pPr>
+            <a:endParaRPr lang="en-US" dirty="0"/>
+          </a:p>
+        </p:txBody>
+      </p:sp>
+      <p:pic>
+        <p:nvPicPr>
+          <p:cNvPr id="5" name="Picture 4">
+            <a:extLst>
+              <a:ext uri="{FF2B5EF4-FFF2-40B4-BE49-F238E27FC236}">
+                <a16:creationId xmlns:a16="http://schemas.microsoft.com/office/drawing/2014/main" id="{D5D9BFB4-97D8-C146-A5C8-9057EAEAF134}"/>
+              </a:ext>
+            </a:extLst>
+          </p:cNvPr>
+          <p:cNvPicPr>
+            <a:picLocks noChangeAspect="1"/>
+          </p:cNvPicPr>
+          <p:nvPr/>
+        </p:nvPicPr>
+        <p:blipFill>
+          <a:blip r:embed="rId3"/>
+          <a:stretch>
+            <a:fillRect/>
+          </a:stretch>
+        </p:blipFill>
+        <p:spPr>
+          <a:xfrm>
+            <a:off x="4286414" y="3773061"/>
+            <a:ext cx="2448924" cy="546298"/>
+          </a:xfrm>
+          <a:prstGeom prst="rect">
+            <a:avLst/>
+          </a:prstGeom>
+        </p:spPr>
+      </p:pic>
+      <p:pic>
+        <p:nvPicPr>
+          <p:cNvPr id="7" name="Picture 6">
+            <a:extLst>
+              <a:ext uri="{FF2B5EF4-FFF2-40B4-BE49-F238E27FC236}">
+                <a16:creationId xmlns:a16="http://schemas.microsoft.com/office/drawing/2014/main" id="{9F378801-97AF-5F4B-B88A-224CBC206610}"/>
+              </a:ext>
+            </a:extLst>
+          </p:cNvPr>
+          <p:cNvPicPr>
+            <a:picLocks noChangeAspect="1"/>
+          </p:cNvPicPr>
+          <p:nvPr/>
+        </p:nvPicPr>
+        <p:blipFill>
+          <a:blip r:embed="rId4"/>
+          <a:stretch>
+            <a:fillRect/>
+          </a:stretch>
+        </p:blipFill>
+        <p:spPr>
+          <a:xfrm>
+            <a:off x="3196621" y="5533525"/>
+            <a:ext cx="6019098" cy="799284"/>
+          </a:xfrm>
+          <a:prstGeom prst="rect">
+            <a:avLst/>
+          </a:prstGeom>
+        </p:spPr>
+      </p:pic>
+    </p:spTree>
+    <p:extLst>
+      <p:ext uri="{BB962C8B-B14F-4D97-AF65-F5344CB8AC3E}">
+        <p14:creationId xmlns:p14="http://schemas.microsoft.com/office/powerpoint/2010/main" val="226093830"/>
+      </p:ext>
+    </p:extLst>
+  </p:cSld>
+  <p:clrMapOvr>
+    <a:masterClrMapping/>
+  </p:clrMapOvr>
+</p:sld>
+</file>
+
+<file path=ppt/slides/slide11.xml><?xml version="1.0" encoding="utf-8"?>
+<p:sld xmlns:a="http://schemas.openxmlformats.org/drawingml/2006/main" xmlns:r="http://schemas.openxmlformats.org/officeDocument/2006/relationships" xmlns:p="http://schemas.openxmlformats.org/presentationml/2006/main" showMasterSp="0">
+  <p:cSld>
+    <p:spTree>
+      <p:nvGrpSpPr>
+        <p:cNvPr id="1" name=""/>
+        <p:cNvGrpSpPr/>
+        <p:nvPr/>
+      </p:nvGrpSpPr>
+      <p:grpSpPr>
+        <a:xfrm>
+          <a:off x="0" y="0"/>
+          <a:ext cx="0" cy="0"/>
+          <a:chOff x="0" y="0"/>
+          <a:chExt cx="0" cy="0"/>
+        </a:xfrm>
+      </p:grpSpPr>
+      <p:sp>
+        <p:nvSpPr>
+          <p:cNvPr id="2" name="Title 1">
+            <a:extLst>
+              <a:ext uri="{FF2B5EF4-FFF2-40B4-BE49-F238E27FC236}">
+                <a16:creationId xmlns:a16="http://schemas.microsoft.com/office/drawing/2014/main" id="{F1BFAD8B-4962-3B48-9A02-F48715463B16}"/>
+              </a:ext>
+            </a:extLst>
+          </p:cNvPr>
+          <p:cNvSpPr>
+            <a:spLocks noGrp="1"/>
+          </p:cNvSpPr>
+          <p:nvPr>
+            <p:ph type="title"/>
+          </p:nvPr>
+        </p:nvSpPr>
         <p:spPr/>
         <p:txBody>
           <a:bodyPr/>
           <a:lstStyle/>
           <a:p>
+            <a:endParaRPr lang="en-US" dirty="0"/>
+          </a:p>
+        </p:txBody>
+      </p:sp>
+      <p:pic>
+        <p:nvPicPr>
+          <p:cNvPr id="5" name="Content Placeholder 4">
+            <a:extLst>
+              <a:ext uri="{FF2B5EF4-FFF2-40B4-BE49-F238E27FC236}">
+                <a16:creationId xmlns:a16="http://schemas.microsoft.com/office/drawing/2014/main" id="{3C7205FF-25BD-DE4B-BD1A-706433C3CDEE}"/>
+              </a:ext>
+            </a:extLst>
+          </p:cNvPr>
+          <p:cNvPicPr>
+            <a:picLocks noGrp="1" noChangeAspect="1"/>
+          </p:cNvPicPr>
+          <p:nvPr>
+            <p:ph idx="1"/>
+          </p:nvPr>
+        </p:nvPicPr>
+        <p:blipFill>
+          <a:blip r:embed="rId3"/>
+          <a:stretch>
+            <a:fillRect/>
+          </a:stretch>
+        </p:blipFill>
+        <p:spPr>
+          <a:xfrm>
+            <a:off x="5172136" y="0"/>
+            <a:ext cx="4744231" cy="6858000"/>
+          </a:xfrm>
+        </p:spPr>
+      </p:pic>
+      <p:sp>
+        <p:nvSpPr>
+          <p:cNvPr id="6" name="TextBox 5">
+            <a:extLst>
+              <a:ext uri="{FF2B5EF4-FFF2-40B4-BE49-F238E27FC236}">
+                <a16:creationId xmlns:a16="http://schemas.microsoft.com/office/drawing/2014/main" id="{CC1227FA-655E-724E-8F1D-14C3657FB24B}"/>
+              </a:ext>
+            </a:extLst>
+          </p:cNvPr>
+          <p:cNvSpPr txBox="1"/>
+          <p:nvPr/>
+        </p:nvSpPr>
+        <p:spPr>
+          <a:xfrm>
+            <a:off x="690901" y="1918010"/>
+            <a:ext cx="3635772" cy="646331"/>
+          </a:xfrm>
+          <a:prstGeom prst="rect">
+            <a:avLst/>
+          </a:prstGeom>
+          <a:noFill/>
+        </p:spPr>
+        <p:txBody>
+          <a:bodyPr wrap="square" rtlCol="0">
+            <a:spAutoFit/>
+          </a:bodyPr>
+          <a:lstStyle/>
+          <a:p>
             <a:r>
               <a:rPr lang="en-US" dirty="0"/>
-              <a:t>Learning how the weights vary </a:t>
-            </a:r>
-            <a:r>
-              <a:rPr lang="en-US" dirty="0" err="1"/>
-              <a:t>w.r.t</a:t>
-            </a:r>
+              <a:t>Optimizing weight dropout on</a:t>
+            </a:r>
+          </a:p>
+          <a:p>
             <a:r>
               <a:rPr lang="en-US" dirty="0"/>
-              <a:t>. hyperparameters can be expensive  - consider a net with 10,000,000 weights and 10 hyperparameters.  Instead learn how the policy/predictions vary </a:t>
-            </a:r>
-            <a:r>
-              <a:rPr lang="en-US" dirty="0" err="1"/>
-              <a:t>w.r.t</a:t>
-            </a:r>
-            <a:r>
-              <a:rPr lang="en-US" dirty="0"/>
-              <a:t> hyperparameters.</a:t>
-            </a:r>
-          </a:p>
-          <a:p>
-            <a:endParaRPr lang="en-US" dirty="0"/>
-          </a:p>
-          <a:p>
-            <a:r>
-              <a:rPr lang="en-US" dirty="0"/>
-              <a:t>This uses special structure found in prediction problems, not found in general bi-level optimizations.</a:t>
+              <a:t>MNIST.</a:t>
             </a:r>
           </a:p>
         </p:txBody>
@@ -13540,7 +14898,104 @@
     </p:spTree>
     <p:extLst>
       <p:ext uri="{BB962C8B-B14F-4D97-AF65-F5344CB8AC3E}">
-        <p14:creationId xmlns:p14="http://schemas.microsoft.com/office/powerpoint/2010/main" val="226093830"/>
+        <p14:creationId xmlns:p14="http://schemas.microsoft.com/office/powerpoint/2010/main" val="144604489"/>
+      </p:ext>
+    </p:extLst>
+  </p:cSld>
+  <p:clrMapOvr>
+    <a:masterClrMapping/>
+  </p:clrMapOvr>
+</p:sld>
+</file>
+
+<file path=ppt/slides/slide12.xml><?xml version="1.0" encoding="utf-8"?>
+<p:sld xmlns:a="http://schemas.openxmlformats.org/drawingml/2006/main" xmlns:r="http://schemas.openxmlformats.org/officeDocument/2006/relationships" xmlns:p="http://schemas.openxmlformats.org/presentationml/2006/main">
+  <p:cSld>
+    <p:spTree>
+      <p:nvGrpSpPr>
+        <p:cNvPr id="1" name=""/>
+        <p:cNvGrpSpPr/>
+        <p:nvPr/>
+      </p:nvGrpSpPr>
+      <p:grpSpPr>
+        <a:xfrm>
+          <a:off x="0" y="0"/>
+          <a:ext cx="0" cy="0"/>
+          <a:chOff x="0" y="0"/>
+          <a:chExt cx="0" cy="0"/>
+        </a:xfrm>
+      </p:grpSpPr>
+      <p:sp>
+        <p:nvSpPr>
+          <p:cNvPr id="2" name="Title 1">
+            <a:extLst>
+              <a:ext uri="{FF2B5EF4-FFF2-40B4-BE49-F238E27FC236}">
+                <a16:creationId xmlns:a16="http://schemas.microsoft.com/office/drawing/2014/main" id="{AE864A9D-2EE2-EC48-AF55-D5125918672B}"/>
+              </a:ext>
+            </a:extLst>
+          </p:cNvPr>
+          <p:cNvSpPr>
+            <a:spLocks noGrp="1"/>
+          </p:cNvSpPr>
+          <p:nvPr>
+            <p:ph type="title"/>
+          </p:nvPr>
+        </p:nvSpPr>
+        <p:spPr/>
+        <p:txBody>
+          <a:bodyPr/>
+          <a:lstStyle/>
+          <a:p>
+            <a:r>
+              <a:rPr lang="en-US" dirty="0"/>
+              <a:t>Related Work</a:t>
+            </a:r>
+          </a:p>
+        </p:txBody>
+      </p:sp>
+      <p:sp>
+        <p:nvSpPr>
+          <p:cNvPr id="3" name="Content Placeholder 2">
+            <a:extLst>
+              <a:ext uri="{FF2B5EF4-FFF2-40B4-BE49-F238E27FC236}">
+                <a16:creationId xmlns:a16="http://schemas.microsoft.com/office/drawing/2014/main" id="{AD1C956F-31F6-9F45-8C57-2472853470D6}"/>
+              </a:ext>
+            </a:extLst>
+          </p:cNvPr>
+          <p:cNvSpPr>
+            <a:spLocks noGrp="1"/>
+          </p:cNvSpPr>
+          <p:nvPr>
+            <p:ph idx="1"/>
+          </p:nvPr>
+        </p:nvSpPr>
+        <p:spPr/>
+        <p:txBody>
+          <a:bodyPr/>
+          <a:lstStyle/>
+          <a:p>
+            <a:r>
+              <a:rPr lang="en-US" dirty="0"/>
+              <a:t>Brock, Andrew, Lim, Theodore, Ritchie, JM, and Weston, Nick. Smash: One-shot model architecture search through hypernetworks. </a:t>
+            </a:r>
+            <a:r>
+              <a:rPr lang="en-US" i="1" dirty="0"/>
+              <a:t>arXiv:1708.05344</a:t>
+            </a:r>
+            <a:r>
+              <a:rPr lang="en-US" dirty="0"/>
+              <a:t>, 2017. </a:t>
+            </a:r>
+          </a:p>
+          <a:p>
+            <a:endParaRPr lang="en-US" dirty="0"/>
+          </a:p>
+        </p:txBody>
+      </p:sp>
+    </p:spTree>
+    <p:extLst>
+      <p:ext uri="{BB962C8B-B14F-4D97-AF65-F5344CB8AC3E}">
+        <p14:creationId xmlns:p14="http://schemas.microsoft.com/office/powerpoint/2010/main" val="3193015954"/>
       </p:ext>
     </p:extLst>
   </p:cSld>
@@ -13583,14 +15038,27 @@
             <p:ph type="title"/>
           </p:nvPr>
         </p:nvSpPr>
-        <p:spPr/>
+        <p:spPr>
+          <a:xfrm>
+            <a:off x="1154954" y="973668"/>
+            <a:ext cx="9996266" cy="706964"/>
+          </a:xfrm>
+        </p:spPr>
         <p:txBody>
           <a:bodyPr/>
           <a:lstStyle/>
           <a:p>
             <a:r>
               <a:rPr lang="en-US" dirty="0"/>
-              <a:t>Cross-valid as Bi-level Opt</a:t>
+              <a:t>Cross-validation as </a:t>
+            </a:r>
+            <a:r>
+              <a:rPr lang="en-US" dirty="0" err="1"/>
+              <a:t>Bilevel</a:t>
+            </a:r>
+            <a:r>
+              <a:rPr lang="en-US" dirty="0"/>
+              <a:t> Optimization</a:t>
             </a:r>
           </a:p>
         </p:txBody>
@@ -13613,7 +15081,7 @@
         </p:nvSpPr>
         <p:spPr>
           <a:xfrm>
-            <a:off x="838200" y="2181011"/>
+            <a:off x="815898" y="2350441"/>
             <a:ext cx="8458200" cy="4346575"/>
           </a:xfrm>
         </p:spPr>
@@ -13635,7 +15103,7 @@
           <a:p>
             <a:r>
               <a:rPr lang="en-US" dirty="0"/>
-              <a:t>Bi-level optimization is like a game with a leader  and a follower player.  Each has their own objective.</a:t>
+              <a:t>Bi-level optimization is a game with a leading player and a following player.  Each has their own objective.</a:t>
             </a:r>
           </a:p>
           <a:p>
@@ -13664,14 +15132,14 @@
           <p:nvPr/>
         </p:nvPicPr>
         <p:blipFill>
-          <a:blip r:embed="rId2"/>
+          <a:blip r:embed="rId3"/>
           <a:stretch>
             <a:fillRect/>
           </a:stretch>
         </p:blipFill>
         <p:spPr>
           <a:xfrm>
-            <a:off x="8877300" y="2322246"/>
+            <a:off x="8877300" y="2350441"/>
             <a:ext cx="2895600" cy="571500"/>
           </a:xfrm>
           <a:prstGeom prst="rect">
@@ -13694,14 +15162,14 @@
           <p:nvPr/>
         </p:nvPicPr>
         <p:blipFill>
-          <a:blip r:embed="rId3"/>
+          <a:blip r:embed="rId4"/>
           <a:stretch>
             <a:fillRect/>
           </a:stretch>
         </p:blipFill>
         <p:spPr>
           <a:xfrm>
-            <a:off x="8877300" y="4523729"/>
+            <a:off x="8877300" y="4523728"/>
             <a:ext cx="2476500" cy="520700"/>
           </a:xfrm>
           <a:prstGeom prst="rect">
@@ -13815,7 +15283,16 @@
             </a:pPr>
             <a:r>
               <a:rPr lang="en-US" dirty="0"/>
-              <a:t>function!</a:t>
+              <a:t>function and amortize </a:t>
+            </a:r>
+          </a:p>
+          <a:p>
+            <a:pPr marL="0" indent="0">
+              <a:buNone/>
+            </a:pPr>
+            <a:r>
+              <a:rPr lang="en-US" dirty="0"/>
+              <a:t>optimization!</a:t>
             </a:r>
           </a:p>
           <a:p>
@@ -13825,24 +15302,9 @@
             <a:endParaRPr lang="en-US" dirty="0"/>
           </a:p>
           <a:p>
-            <a:endParaRPr lang="en-US" dirty="0"/>
-          </a:p>
-          <a:p>
-            <a:endParaRPr lang="en-US" dirty="0"/>
-          </a:p>
-          <a:p>
             <a:pPr marL="0" indent="0">
               <a:buNone/>
             </a:pPr>
-            <a:endParaRPr lang="en-US" dirty="0"/>
-          </a:p>
-          <a:p>
-            <a:pPr marL="0" indent="0">
-              <a:buNone/>
-            </a:pPr>
-            <a:endParaRPr lang="en-US" dirty="0"/>
-          </a:p>
-          <a:p>
             <a:endParaRPr lang="en-US" dirty="0"/>
           </a:p>
           <a:p>
@@ -13868,14 +15330,14 @@
           <p:nvPr/>
         </p:nvPicPr>
         <p:blipFill>
-          <a:blip r:embed="rId2"/>
+          <a:blip r:embed="rId3"/>
           <a:stretch>
             <a:fillRect/>
           </a:stretch>
         </p:blipFill>
         <p:spPr>
           <a:xfrm>
-            <a:off x="1795944" y="3140185"/>
+            <a:off x="973317" y="4066293"/>
             <a:ext cx="2476500" cy="520700"/>
           </a:xfrm>
           <a:prstGeom prst="rect">
@@ -13898,14 +15360,14 @@
           <p:nvPr/>
         </p:nvPicPr>
         <p:blipFill>
-          <a:blip r:embed="rId3"/>
+          <a:blip r:embed="rId4"/>
           <a:stretch>
             <a:fillRect/>
           </a:stretch>
         </p:blipFill>
         <p:spPr>
           <a:xfrm>
-            <a:off x="4504531" y="2222410"/>
+            <a:off x="4272444" y="2498788"/>
             <a:ext cx="7627938" cy="3865212"/>
           </a:xfrm>
           <a:prstGeom prst="rect">
@@ -13928,14 +15390,14 @@
           <p:nvPr/>
         </p:nvPicPr>
         <p:blipFill>
-          <a:blip r:embed="rId4"/>
+          <a:blip r:embed="rId5"/>
           <a:stretch>
             <a:fillRect/>
           </a:stretch>
         </p:blipFill>
         <p:spPr>
           <a:xfrm>
-            <a:off x="3390540" y="6411647"/>
+            <a:off x="753600" y="5842680"/>
             <a:ext cx="3327400" cy="342900"/>
           </a:xfrm>
           <a:prstGeom prst="rect">
@@ -14157,7 +15619,7 @@
           <p:nvPr/>
         </p:nvPicPr>
         <p:blipFill>
-          <a:blip r:embed="rId2"/>
+          <a:blip r:embed="rId3"/>
           <a:stretch>
             <a:fillRect/>
           </a:stretch>
@@ -14187,7 +15649,7 @@
           <p:nvPr/>
         </p:nvPicPr>
         <p:blipFill>
-          <a:blip r:embed="rId3"/>
+          <a:blip r:embed="rId4"/>
           <a:stretch>
             <a:fillRect/>
           </a:stretch>
@@ -14257,18 +15719,118 @@
           </p:nvPr>
         </p:nvPicPr>
         <p:blipFill>
-          <a:blip r:embed="rId2"/>
+          <a:blip r:embed="rId3"/>
           <a:stretch>
             <a:fillRect/>
           </a:stretch>
         </p:blipFill>
         <p:spPr>
           <a:xfrm>
-            <a:off x="4035088" y="-1"/>
+            <a:off x="7313546" y="2283"/>
             <a:ext cx="4591327" cy="6855717"/>
           </a:xfrm>
         </p:spPr>
       </p:pic>
+      <p:pic>
+        <p:nvPicPr>
+          <p:cNvPr id="3" name="Content Placeholder 4">
+            <a:extLst>
+              <a:ext uri="{FF2B5EF4-FFF2-40B4-BE49-F238E27FC236}">
+                <a16:creationId xmlns:a16="http://schemas.microsoft.com/office/drawing/2014/main" id="{26308D81-7451-8641-95B2-2FB95BEC2D36}"/>
+              </a:ext>
+            </a:extLst>
+          </p:cNvPr>
+          <p:cNvPicPr>
+            <a:picLocks noChangeAspect="1"/>
+          </p:cNvPicPr>
+          <p:nvPr/>
+        </p:nvPicPr>
+        <p:blipFill>
+          <a:blip r:embed="rId4"/>
+          <a:stretch>
+            <a:fillRect/>
+          </a:stretch>
+        </p:blipFill>
+        <p:spPr>
+          <a:xfrm>
+            <a:off x="1003610" y="2283"/>
+            <a:ext cx="5710271" cy="6867157"/>
+          </a:xfrm>
+          <a:prstGeom prst="rect">
+            <a:avLst/>
+          </a:prstGeom>
+        </p:spPr>
+      </p:pic>
+      <p:sp>
+        <p:nvSpPr>
+          <p:cNvPr id="2" name="TextBox 1">
+            <a:extLst>
+              <a:ext uri="{FF2B5EF4-FFF2-40B4-BE49-F238E27FC236}">
+                <a16:creationId xmlns:a16="http://schemas.microsoft.com/office/drawing/2014/main" id="{720B07F7-324A-0C44-A5AC-417B6B932CA7}"/>
+              </a:ext>
+            </a:extLst>
+          </p:cNvPr>
+          <p:cNvSpPr txBox="1"/>
+          <p:nvPr/>
+        </p:nvSpPr>
+        <p:spPr>
+          <a:xfrm>
+            <a:off x="199473" y="557561"/>
+            <a:ext cx="1008609" cy="369332"/>
+          </a:xfrm>
+          <a:prstGeom prst="rect">
+            <a:avLst/>
+          </a:prstGeom>
+          <a:noFill/>
+        </p:spPr>
+        <p:txBody>
+          <a:bodyPr wrap="none" rtlCol="0">
+            <a:spAutoFit/>
+          </a:bodyPr>
+          <a:lstStyle/>
+          <a:p>
+            <a:r>
+              <a:rPr lang="en-US" dirty="0"/>
+              <a:t>Global:</a:t>
+            </a:r>
+          </a:p>
+        </p:txBody>
+      </p:sp>
+      <p:sp>
+        <p:nvSpPr>
+          <p:cNvPr id="4" name="TextBox 3">
+            <a:extLst>
+              <a:ext uri="{FF2B5EF4-FFF2-40B4-BE49-F238E27FC236}">
+                <a16:creationId xmlns:a16="http://schemas.microsoft.com/office/drawing/2014/main" id="{310D272B-AB04-7948-992D-0B87AED3B134}"/>
+              </a:ext>
+            </a:extLst>
+          </p:cNvPr>
+          <p:cNvSpPr txBox="1"/>
+          <p:nvPr/>
+        </p:nvSpPr>
+        <p:spPr>
+          <a:xfrm>
+            <a:off x="6883780" y="557561"/>
+            <a:ext cx="859531" cy="369332"/>
+          </a:xfrm>
+          <a:prstGeom prst="rect">
+            <a:avLst/>
+          </a:prstGeom>
+          <a:noFill/>
+        </p:spPr>
+        <p:txBody>
+          <a:bodyPr wrap="none" rtlCol="0">
+            <a:spAutoFit/>
+          </a:bodyPr>
+          <a:lstStyle/>
+          <a:p>
+            <a:r>
+              <a:rPr lang="en-US" dirty="0"/>
+              <a:t>Local:</a:t>
+            </a:r>
+          </a:p>
+        </p:txBody>
+      </p:sp>
     </p:spTree>
     <p:extLst>
       <p:ext uri="{BB962C8B-B14F-4D97-AF65-F5344CB8AC3E}">
@@ -14438,11 +16000,46 @@
         </p:blipFill>
         <p:spPr>
           <a:xfrm>
-            <a:off x="3731047" y="2496728"/>
-            <a:ext cx="4998885" cy="4361272"/>
+            <a:off x="446049" y="3143059"/>
+            <a:ext cx="4148253" cy="3619139"/>
           </a:xfrm>
         </p:spPr>
       </p:pic>
+      <p:sp>
+        <p:nvSpPr>
+          <p:cNvPr id="3" name="TextBox 2">
+            <a:extLst>
+              <a:ext uri="{FF2B5EF4-FFF2-40B4-BE49-F238E27FC236}">
+                <a16:creationId xmlns:a16="http://schemas.microsoft.com/office/drawing/2014/main" id="{47D509E4-2B5E-564D-84A9-9B349884B5D6}"/>
+              </a:ext>
+            </a:extLst>
+          </p:cNvPr>
+          <p:cNvSpPr txBox="1"/>
+          <p:nvPr/>
+        </p:nvSpPr>
+        <p:spPr>
+          <a:xfrm>
+            <a:off x="446049" y="2496728"/>
+            <a:ext cx="5731727" cy="646331"/>
+          </a:xfrm>
+          <a:prstGeom prst="rect">
+            <a:avLst/>
+          </a:prstGeom>
+          <a:noFill/>
+        </p:spPr>
+        <p:txBody>
+          <a:bodyPr wrap="square" rtlCol="0">
+            <a:spAutoFit/>
+          </a:bodyPr>
+          <a:lstStyle/>
+          <a:p>
+            <a:r>
+              <a:rPr lang="en-US" dirty="0"/>
+              <a:t>Idea: Hyper-training is effective because it partially optimizes across many hyperparameters. </a:t>
+            </a:r>
+          </a:p>
+        </p:txBody>
+      </p:sp>
     </p:spTree>
     <p:extLst>
       <p:ext uri="{BB962C8B-B14F-4D97-AF65-F5344CB8AC3E}">
@@ -14517,7 +16114,12 @@
             <p:ph idx="1"/>
           </p:nvPr>
         </p:nvSpPr>
-        <p:spPr/>
+        <p:spPr>
+          <a:xfrm>
+            <a:off x="1154954" y="2603499"/>
+            <a:ext cx="8825659" cy="4064929"/>
+          </a:xfrm>
+        </p:spPr>
         <p:txBody>
           <a:bodyPr>
             <a:normAutofit/>
@@ -14554,6 +16156,15 @@
             <a:r>
               <a:rPr lang="en-US" dirty="0"/>
               <a:t>Hard to choose the distribution of hyperparameters to train against.</a:t>
+            </a:r>
+          </a:p>
+          <a:p>
+            <a:endParaRPr lang="en-US" dirty="0"/>
+          </a:p>
+          <a:p>
+            <a:r>
+              <a:rPr lang="en-US" dirty="0"/>
+              <a:t>Potentially more expensive training iterations.</a:t>
             </a:r>
           </a:p>
         </p:txBody>
@@ -14833,4 +16444,299 @@
     </a:ext>
   </a:extLst>
 </a:theme>
+</file>
+
+<file path=ppt/theme/theme2.xml><?xml version="1.0" encoding="utf-8"?>
+<a:theme xmlns:a="http://schemas.openxmlformats.org/drawingml/2006/main" name="Office Theme">
+  <a:themeElements>
+    <a:clrScheme name="Office">
+      <a:dk1>
+        <a:sysClr val="windowText" lastClr="000000"/>
+      </a:dk1>
+      <a:lt1>
+        <a:sysClr val="window" lastClr="FFFFFF"/>
+      </a:lt1>
+      <a:dk2>
+        <a:srgbClr val="44546A"/>
+      </a:dk2>
+      <a:lt2>
+        <a:srgbClr val="E7E6E6"/>
+      </a:lt2>
+      <a:accent1>
+        <a:srgbClr val="4472C4"/>
+      </a:accent1>
+      <a:accent2>
+        <a:srgbClr val="ED7D31"/>
+      </a:accent2>
+      <a:accent3>
+        <a:srgbClr val="A5A5A5"/>
+      </a:accent3>
+      <a:accent4>
+        <a:srgbClr val="FFC000"/>
+      </a:accent4>
+      <a:accent5>
+        <a:srgbClr val="5B9BD5"/>
+      </a:accent5>
+      <a:accent6>
+        <a:srgbClr val="70AD47"/>
+      </a:accent6>
+      <a:hlink>
+        <a:srgbClr val="0563C1"/>
+      </a:hlink>
+      <a:folHlink>
+        <a:srgbClr val="954F72"/>
+      </a:folHlink>
+    </a:clrScheme>
+    <a:fontScheme name="Office">
+      <a:majorFont>
+        <a:latin typeface="Calibri Light" panose="020F0302020204030204"/>
+        <a:ea typeface=""/>
+        <a:cs typeface=""/>
+        <a:font script="Jpan" typeface="游ゴシック Light"/>
+        <a:font script="Hang" typeface="맑은 고딕"/>
+        <a:font script="Hans" typeface="等线 Light"/>
+        <a:font script="Hant" typeface="新細明體"/>
+        <a:font script="Arab" typeface="Times New Roman"/>
+        <a:font script="Hebr" typeface="Times New Roman"/>
+        <a:font script="Thai" typeface="Angsana New"/>
+        <a:font script="Ethi" typeface="Nyala"/>
+        <a:font script="Beng" typeface="Vrinda"/>
+        <a:font script="Gujr" typeface="Shruti"/>
+        <a:font script="Khmr" typeface="MoolBoran"/>
+        <a:font script="Knda" typeface="Tunga"/>
+        <a:font script="Guru" typeface="Raavi"/>
+        <a:font script="Cans" typeface="Euphemia"/>
+        <a:font script="Cher" typeface="Plantagenet Cherokee"/>
+        <a:font script="Yiii" typeface="Microsoft Yi Baiti"/>
+        <a:font script="Tibt" typeface="Microsoft Himalaya"/>
+        <a:font script="Thaa" typeface="MV Boli"/>
+        <a:font script="Deva" typeface="Mangal"/>
+        <a:font script="Telu" typeface="Gautami"/>
+        <a:font script="Taml" typeface="Latha"/>
+        <a:font script="Syrc" typeface="Estrangelo Edessa"/>
+        <a:font script="Orya" typeface="Kalinga"/>
+        <a:font script="Mlym" typeface="Kartika"/>
+        <a:font script="Laoo" typeface="DokChampa"/>
+        <a:font script="Sinh" typeface="Iskoola Pota"/>
+        <a:font script="Mong" typeface="Mongolian Baiti"/>
+        <a:font script="Viet" typeface="Times New Roman"/>
+        <a:font script="Uigh" typeface="Microsoft Uighur"/>
+        <a:font script="Geor" typeface="Sylfaen"/>
+        <a:font script="Armn" typeface="Arial"/>
+        <a:font script="Bugi" typeface="Leelawadee UI"/>
+        <a:font script="Bopo" typeface="Microsoft JhengHei"/>
+        <a:font script="Java" typeface="Javanese Text"/>
+        <a:font script="Lisu" typeface="Segoe UI"/>
+        <a:font script="Mymr" typeface="Myanmar Text"/>
+        <a:font script="Nkoo" typeface="Ebrima"/>
+        <a:font script="Olck" typeface="Nirmala UI"/>
+        <a:font script="Osma" typeface="Ebrima"/>
+        <a:font script="Phag" typeface="Phagspa"/>
+        <a:font script="Syrn" typeface="Estrangelo Edessa"/>
+        <a:font script="Syrj" typeface="Estrangelo Edessa"/>
+        <a:font script="Syre" typeface="Estrangelo Edessa"/>
+        <a:font script="Sora" typeface="Nirmala UI"/>
+        <a:font script="Tale" typeface="Microsoft Tai Le"/>
+        <a:font script="Talu" typeface="Microsoft New Tai Lue"/>
+        <a:font script="Tfng" typeface="Ebrima"/>
+      </a:majorFont>
+      <a:minorFont>
+        <a:latin typeface="Calibri" panose="020F0502020204030204"/>
+        <a:ea typeface=""/>
+        <a:cs typeface=""/>
+        <a:font script="Jpan" typeface="游ゴシック"/>
+        <a:font script="Hang" typeface="맑은 고딕"/>
+        <a:font script="Hans" typeface="等线"/>
+        <a:font script="Hant" typeface="新細明體"/>
+        <a:font script="Arab" typeface="Arial"/>
+        <a:font script="Hebr" typeface="Arial"/>
+        <a:font script="Thai" typeface="Cordia New"/>
+        <a:font script="Ethi" typeface="Nyala"/>
+        <a:font script="Beng" typeface="Vrinda"/>
+        <a:font script="Gujr" typeface="Shruti"/>
+        <a:font script="Khmr" typeface="DaunPenh"/>
+        <a:font script="Knda" typeface="Tunga"/>
+        <a:font script="Guru" typeface="Raavi"/>
+        <a:font script="Cans" typeface="Euphemia"/>
+        <a:font script="Cher" typeface="Plantagenet Cherokee"/>
+        <a:font script="Yiii" typeface="Microsoft Yi Baiti"/>
+        <a:font script="Tibt" typeface="Microsoft Himalaya"/>
+        <a:font script="Thaa" typeface="MV Boli"/>
+        <a:font script="Deva" typeface="Mangal"/>
+        <a:font script="Telu" typeface="Gautami"/>
+        <a:font script="Taml" typeface="Latha"/>
+        <a:font script="Syrc" typeface="Estrangelo Edessa"/>
+        <a:font script="Orya" typeface="Kalinga"/>
+        <a:font script="Mlym" typeface="Kartika"/>
+        <a:font script="Laoo" typeface="DokChampa"/>
+        <a:font script="Sinh" typeface="Iskoola Pota"/>
+        <a:font script="Mong" typeface="Mongolian Baiti"/>
+        <a:font script="Viet" typeface="Arial"/>
+        <a:font script="Uigh" typeface="Microsoft Uighur"/>
+        <a:font script="Geor" typeface="Sylfaen"/>
+        <a:font script="Armn" typeface="Arial"/>
+        <a:font script="Bugi" typeface="Leelawadee UI"/>
+        <a:font script="Bopo" typeface="Microsoft JhengHei"/>
+        <a:font script="Java" typeface="Javanese Text"/>
+        <a:font script="Lisu" typeface="Segoe UI"/>
+        <a:font script="Mymr" typeface="Myanmar Text"/>
+        <a:font script="Nkoo" typeface="Ebrima"/>
+        <a:font script="Olck" typeface="Nirmala UI"/>
+        <a:font script="Osma" typeface="Ebrima"/>
+        <a:font script="Phag" typeface="Phagspa"/>
+        <a:font script="Syrn" typeface="Estrangelo Edessa"/>
+        <a:font script="Syrj" typeface="Estrangelo Edessa"/>
+        <a:font script="Syre" typeface="Estrangelo Edessa"/>
+        <a:font script="Sora" typeface="Nirmala UI"/>
+        <a:font script="Tale" typeface="Microsoft Tai Le"/>
+        <a:font script="Talu" typeface="Microsoft New Tai Lue"/>
+        <a:font script="Tfng" typeface="Ebrima"/>
+      </a:minorFont>
+    </a:fontScheme>
+    <a:fmtScheme name="Office">
+      <a:fillStyleLst>
+        <a:solidFill>
+          <a:schemeClr val="phClr"/>
+        </a:solidFill>
+        <a:gradFill rotWithShape="1">
+          <a:gsLst>
+            <a:gs pos="0">
+              <a:schemeClr val="phClr">
+                <a:lumMod val="110000"/>
+                <a:satMod val="105000"/>
+                <a:tint val="67000"/>
+              </a:schemeClr>
+            </a:gs>
+            <a:gs pos="50000">
+              <a:schemeClr val="phClr">
+                <a:lumMod val="105000"/>
+                <a:satMod val="103000"/>
+                <a:tint val="73000"/>
+              </a:schemeClr>
+            </a:gs>
+            <a:gs pos="100000">
+              <a:schemeClr val="phClr">
+                <a:lumMod val="105000"/>
+                <a:satMod val="109000"/>
+                <a:tint val="81000"/>
+              </a:schemeClr>
+            </a:gs>
+          </a:gsLst>
+          <a:lin ang="5400000" scaled="0"/>
+        </a:gradFill>
+        <a:gradFill rotWithShape="1">
+          <a:gsLst>
+            <a:gs pos="0">
+              <a:schemeClr val="phClr">
+                <a:satMod val="103000"/>
+                <a:lumMod val="102000"/>
+                <a:tint val="94000"/>
+              </a:schemeClr>
+            </a:gs>
+            <a:gs pos="50000">
+              <a:schemeClr val="phClr">
+                <a:satMod val="110000"/>
+                <a:lumMod val="100000"/>
+                <a:shade val="100000"/>
+              </a:schemeClr>
+            </a:gs>
+            <a:gs pos="100000">
+              <a:schemeClr val="phClr">
+                <a:lumMod val="99000"/>
+                <a:satMod val="120000"/>
+                <a:shade val="78000"/>
+              </a:schemeClr>
+            </a:gs>
+          </a:gsLst>
+          <a:lin ang="5400000" scaled="0"/>
+        </a:gradFill>
+      </a:fillStyleLst>
+      <a:lnStyleLst>
+        <a:ln w="6350" cap="flat" cmpd="sng" algn="ctr">
+          <a:solidFill>
+            <a:schemeClr val="phClr"/>
+          </a:solidFill>
+          <a:prstDash val="solid"/>
+          <a:miter lim="800000"/>
+        </a:ln>
+        <a:ln w="12700" cap="flat" cmpd="sng" algn="ctr">
+          <a:solidFill>
+            <a:schemeClr val="phClr"/>
+          </a:solidFill>
+          <a:prstDash val="solid"/>
+          <a:miter lim="800000"/>
+        </a:ln>
+        <a:ln w="19050" cap="flat" cmpd="sng" algn="ctr">
+          <a:solidFill>
+            <a:schemeClr val="phClr"/>
+          </a:solidFill>
+          <a:prstDash val="solid"/>
+          <a:miter lim="800000"/>
+        </a:ln>
+      </a:lnStyleLst>
+      <a:effectStyleLst>
+        <a:effectStyle>
+          <a:effectLst/>
+        </a:effectStyle>
+        <a:effectStyle>
+          <a:effectLst/>
+        </a:effectStyle>
+        <a:effectStyle>
+          <a:effectLst>
+            <a:outerShdw blurRad="57150" dist="19050" dir="5400000" algn="ctr" rotWithShape="0">
+              <a:srgbClr val="000000">
+                <a:alpha val="63000"/>
+              </a:srgbClr>
+            </a:outerShdw>
+          </a:effectLst>
+        </a:effectStyle>
+      </a:effectStyleLst>
+      <a:bgFillStyleLst>
+        <a:solidFill>
+          <a:schemeClr val="phClr"/>
+        </a:solidFill>
+        <a:solidFill>
+          <a:schemeClr val="phClr">
+            <a:tint val="95000"/>
+            <a:satMod val="170000"/>
+          </a:schemeClr>
+        </a:solidFill>
+        <a:gradFill rotWithShape="1">
+          <a:gsLst>
+            <a:gs pos="0">
+              <a:schemeClr val="phClr">
+                <a:tint val="93000"/>
+                <a:satMod val="150000"/>
+                <a:shade val="98000"/>
+                <a:lumMod val="102000"/>
+              </a:schemeClr>
+            </a:gs>
+            <a:gs pos="50000">
+              <a:schemeClr val="phClr">
+                <a:tint val="98000"/>
+                <a:satMod val="130000"/>
+                <a:shade val="90000"/>
+                <a:lumMod val="103000"/>
+              </a:schemeClr>
+            </a:gs>
+            <a:gs pos="100000">
+              <a:schemeClr val="phClr">
+                <a:shade val="63000"/>
+                <a:satMod val="120000"/>
+              </a:schemeClr>
+            </a:gs>
+          </a:gsLst>
+          <a:lin ang="5400000" scaled="0"/>
+        </a:gradFill>
+      </a:bgFillStyleLst>
+    </a:fmtScheme>
+  </a:themeElements>
+  <a:objectDefaults/>
+  <a:extraClrSchemeLst/>
+  <a:extLst>
+    <a:ext uri="{05A4C25C-085E-4340-85A3-A5531E510DB2}">
+      <thm15:themeFamily xmlns:thm15="http://schemas.microsoft.com/office/thememl/2012/main" name="Office Theme" id="{62F939B6-93AF-4DB8-9C6B-D6C7DFDC589F}" vid="{4A3C46E8-61CC-4603-A589-7422A47A8E4A}"/>
+    </a:ext>
+  </a:extLst>
+</a:theme>
 </file>
</xml_diff>